<commit_message>
before last push for supplemental
</commit_message>
<xml_diff>
--- a/diagrams/figure-1-kachemak.pptx
+++ b/diagrams/figure-1-kachemak.pptx
@@ -104,7 +104,41 @@
       </a:defRPr>
     </a:lvl9pPr>
   </p:defaultTextStyle>
+  <p:extLst>
+    <p:ext uri="{EFAFB233-063F-42B5-8137-9DF3F51BA10A}">
+      <p15:sldGuideLst xmlns:p15="http://schemas.microsoft.com/office/powerpoint/2012/main"/>
+    </p:ext>
+  </p:extLst>
 </p:presentation>
+</file>
+
+<file path=ppt/changesInfos/changesInfo1.xml><?xml version="1.0" encoding="utf-8"?>
+<pc:chgInfo xmlns:a="http://schemas.openxmlformats.org/drawingml/2006/main" xmlns:r="http://schemas.openxmlformats.org/officeDocument/2006/relationships" xmlns:ac="http://schemas.microsoft.com/office/drawing/2013/main/command" xmlns:pc="http://schemas.microsoft.com/office/powerpoint/2013/main/command">
+  <pc:docChgLst>
+    <pc:chgData name="Buck Bukaty" userId="7497a918b422615f" providerId="LiveId" clId="{C428A483-91AF-45A3-8E5A-899E74AD30A1}"/>
+    <pc:docChg chg="custSel modSld">
+      <pc:chgData name="Buck Bukaty" userId="7497a918b422615f" providerId="LiveId" clId="{C428A483-91AF-45A3-8E5A-899E74AD30A1}" dt="2024-05-14T15:13:37.308" v="0" actId="478"/>
+      <pc:docMkLst>
+        <pc:docMk/>
+      </pc:docMkLst>
+      <pc:sldChg chg="delSp mod">
+        <pc:chgData name="Buck Bukaty" userId="7497a918b422615f" providerId="LiveId" clId="{C428A483-91AF-45A3-8E5A-899E74AD30A1}" dt="2024-05-14T15:13:37.308" v="0" actId="478"/>
+        <pc:sldMkLst>
+          <pc:docMk/>
+          <pc:sldMk cId="4177762881" sldId="256"/>
+        </pc:sldMkLst>
+        <pc:spChg chg="del">
+          <ac:chgData name="Buck Bukaty" userId="7497a918b422615f" providerId="LiveId" clId="{C428A483-91AF-45A3-8E5A-899E74AD30A1}" dt="2024-05-14T15:13:37.308" v="0" actId="478"/>
+          <ac:spMkLst>
+            <pc:docMk/>
+            <pc:sldMk cId="4177762881" sldId="256"/>
+            <ac:spMk id="33" creationId="{287353CB-5ABE-418D-95E9-173D5E4A8475}"/>
+          </ac:spMkLst>
+        </pc:spChg>
+      </pc:sldChg>
+    </pc:docChg>
+  </pc:docChgLst>
+</pc:chgInfo>
 </file>
 
 <file path=ppt/slideLayouts/slideLayout1.xml><?xml version="1.0" encoding="utf-8"?>
@@ -238,7 +272,7 @@
           <a:p>
             <a:fld id="{EEA919E1-EFFE-43B0-B892-35C3DE72B480}" type="datetimeFigureOut">
               <a:rPr lang="en-US" smtClean="0"/>
-              <a:t>5/12/2024</a:t>
+              <a:t>5/14/2024</a:t>
             </a:fld>
             <a:endParaRPr lang="en-US"/>
           </a:p>
@@ -408,7 +442,7 @@
           <a:p>
             <a:fld id="{EEA919E1-EFFE-43B0-B892-35C3DE72B480}" type="datetimeFigureOut">
               <a:rPr lang="en-US" smtClean="0"/>
-              <a:t>5/12/2024</a:t>
+              <a:t>5/14/2024</a:t>
             </a:fld>
             <a:endParaRPr lang="en-US"/>
           </a:p>
@@ -588,7 +622,7 @@
           <a:p>
             <a:fld id="{EEA919E1-EFFE-43B0-B892-35C3DE72B480}" type="datetimeFigureOut">
               <a:rPr lang="en-US" smtClean="0"/>
-              <a:t>5/12/2024</a:t>
+              <a:t>5/14/2024</a:t>
             </a:fld>
             <a:endParaRPr lang="en-US"/>
           </a:p>
@@ -758,7 +792,7 @@
           <a:p>
             <a:fld id="{EEA919E1-EFFE-43B0-B892-35C3DE72B480}" type="datetimeFigureOut">
               <a:rPr lang="en-US" smtClean="0"/>
-              <a:t>5/12/2024</a:t>
+              <a:t>5/14/2024</a:t>
             </a:fld>
             <a:endParaRPr lang="en-US"/>
           </a:p>
@@ -1004,7 +1038,7 @@
           <a:p>
             <a:fld id="{EEA919E1-EFFE-43B0-B892-35C3DE72B480}" type="datetimeFigureOut">
               <a:rPr lang="en-US" smtClean="0"/>
-              <a:t>5/12/2024</a:t>
+              <a:t>5/14/2024</a:t>
             </a:fld>
             <a:endParaRPr lang="en-US"/>
           </a:p>
@@ -1236,7 +1270,7 @@
           <a:p>
             <a:fld id="{EEA919E1-EFFE-43B0-B892-35C3DE72B480}" type="datetimeFigureOut">
               <a:rPr lang="en-US" smtClean="0"/>
-              <a:t>5/12/2024</a:t>
+              <a:t>5/14/2024</a:t>
             </a:fld>
             <a:endParaRPr lang="en-US"/>
           </a:p>
@@ -1603,7 +1637,7 @@
           <a:p>
             <a:fld id="{EEA919E1-EFFE-43B0-B892-35C3DE72B480}" type="datetimeFigureOut">
               <a:rPr lang="en-US" smtClean="0"/>
-              <a:t>5/12/2024</a:t>
+              <a:t>5/14/2024</a:t>
             </a:fld>
             <a:endParaRPr lang="en-US"/>
           </a:p>
@@ -1721,7 +1755,7 @@
           <a:p>
             <a:fld id="{EEA919E1-EFFE-43B0-B892-35C3DE72B480}" type="datetimeFigureOut">
               <a:rPr lang="en-US" smtClean="0"/>
-              <a:t>5/12/2024</a:t>
+              <a:t>5/14/2024</a:t>
             </a:fld>
             <a:endParaRPr lang="en-US"/>
           </a:p>
@@ -1816,7 +1850,7 @@
           <a:p>
             <a:fld id="{EEA919E1-EFFE-43B0-B892-35C3DE72B480}" type="datetimeFigureOut">
               <a:rPr lang="en-US" smtClean="0"/>
-              <a:t>5/12/2024</a:t>
+              <a:t>5/14/2024</a:t>
             </a:fld>
             <a:endParaRPr lang="en-US"/>
           </a:p>
@@ -2093,7 +2127,7 @@
           <a:p>
             <a:fld id="{EEA919E1-EFFE-43B0-B892-35C3DE72B480}" type="datetimeFigureOut">
               <a:rPr lang="en-US" smtClean="0"/>
-              <a:t>5/12/2024</a:t>
+              <a:t>5/14/2024</a:t>
             </a:fld>
             <a:endParaRPr lang="en-US"/>
           </a:p>
@@ -2350,7 +2384,7 @@
           <a:p>
             <a:fld id="{EEA919E1-EFFE-43B0-B892-35C3DE72B480}" type="datetimeFigureOut">
               <a:rPr lang="en-US" smtClean="0"/>
-              <a:t>5/12/2024</a:t>
+              <a:t>5/14/2024</a:t>
             </a:fld>
             <a:endParaRPr lang="en-US"/>
           </a:p>
@@ -2563,7 +2597,7 @@
           <a:p>
             <a:fld id="{EEA919E1-EFFE-43B0-B892-35C3DE72B480}" type="datetimeFigureOut">
               <a:rPr lang="en-US" smtClean="0"/>
-              <a:t>5/12/2024</a:t>
+              <a:t>5/14/2024</a:t>
             </a:fld>
             <a:endParaRPr lang="en-US"/>
           </a:p>
@@ -3118,71 +3152,6 @@
           </a:prstGeom>
         </p:spPr>
       </p:pic>
-      <p:sp>
-        <p:nvSpPr>
-          <p:cNvPr id="33" name="TextBox 32">
-            <a:extLst>
-              <a:ext uri="{FF2B5EF4-FFF2-40B4-BE49-F238E27FC236}">
-                <a16:creationId xmlns:a16="http://schemas.microsoft.com/office/drawing/2014/main" id="{287353CB-5ABE-418D-95E9-173D5E4A8475}"/>
-              </a:ext>
-            </a:extLst>
-          </p:cNvPr>
-          <p:cNvSpPr txBox="1"/>
-          <p:nvPr/>
-        </p:nvSpPr>
-        <p:spPr>
-          <a:xfrm>
-            <a:off x="1200150" y="3725614"/>
-            <a:ext cx="4387850" cy="1077218"/>
-          </a:xfrm>
-          <a:prstGeom prst="rect">
-            <a:avLst/>
-          </a:prstGeom>
-          <a:noFill/>
-        </p:spPr>
-        <p:txBody>
-          <a:bodyPr wrap="square" rtlCol="0">
-            <a:spAutoFit/>
-          </a:bodyPr>
-          <a:lstStyle/>
-          <a:p>
-            <a:r>
-              <a:rPr lang="en-US" sz="800" b="0" i="0" u="none" strike="noStrike" dirty="0">
-                <a:solidFill>
-                  <a:srgbClr val="000000"/>
-                </a:solidFill>
-                <a:effectLst/>
-                <a:latin typeface="Arial" panose="020B0604020202020204" pitchFamily="34" charset="0"/>
-              </a:rPr>
-              <a:t>Figure 1. Profile of a temperature logger recording at 30 minute intervals in the mid-intertidal zone at Kachemak Bay, Alaska USA during the period of 2013-2023 (</a:t>
-            </a:r>
-            <a:r>
-              <a:rPr lang="en-US" sz="800" b="0" i="0" u="none" strike="noStrike" dirty="0">
-                <a:solidFill>
-                  <a:srgbClr val="000000"/>
-                </a:solidFill>
-                <a:effectLst/>
-                <a:highlight>
-                  <a:srgbClr val="FFFF00"/>
-                </a:highlight>
-                <a:latin typeface="Arial" panose="020B0604020202020204" pitchFamily="34" charset="0"/>
-              </a:rPr>
-              <a:t>CITE Data Source - https://doi.org/10.5066/F7WH2N3T</a:t>
-            </a:r>
-            <a:r>
-              <a:rPr lang="en-US" sz="800" b="0" i="0" u="none" strike="noStrike" dirty="0">
-                <a:solidFill>
-                  <a:srgbClr val="000000"/>
-                </a:solidFill>
-                <a:effectLst/>
-                <a:latin typeface="Arial" panose="020B0604020202020204" pitchFamily="34" charset="0"/>
-              </a:rPr>
-              <a:t>). (Top) One decade of temperature data (blue) and the mean temperature for each day calculated across the dataset (black, repeated yearly). Also pictured is the 90th percentile of daily maximum temperatures across the dataset (dotted red). (Middle Left) One year of data for 2017, a relatively cool year. (Middle Right) One year of data for 2019, a relatively hot year. (Bottom Left) Data for September 2017. (Bottom Right) Data for September 2019. For all panels colors are as in top panel legend.</a:t>
-            </a:r>
-            <a:endParaRPr lang="en-US" sz="800" dirty="0"/>
-          </a:p>
-        </p:txBody>
-      </p:sp>
     </p:spTree>
     <p:extLst>
       <p:ext uri="{BB962C8B-B14F-4D97-AF65-F5344CB8AC3E}">

</xml_diff>